<commit_message>
updated lecture - typo
</commit_message>
<xml_diff>
--- a/rhe306-spring2014/documents/logosLecture.pptx
+++ b/rhe306-spring2014/documents/logosLecture.pptx
@@ -205,7 +205,7 @@
           <a:p>
             <a:fld id="{C7D41FAA-B7A4-2E46-867F-180959296F4C}" type="datetimeFigureOut">
               <a:rPr lang="en-US" smtClean="0"/>
-              <a:t>3/3/14</a:t>
+              <a:t>3/4/14</a:t>
             </a:fld>
             <a:endParaRPr lang="en-US"/>
           </a:p>
@@ -1037,7 +1037,7 @@
             <a:fld id="{451DEABC-D766-4322-8E78-B830FAE35C72}" type="datetime4">
               <a:rPr lang="en-US" smtClean="0"/>
               <a:pPr/>
-              <a:t>March 3, 2014</a:t>
+              <a:t>March 4, 2014</a:t>
             </a:fld>
             <a:endParaRPr lang="en-US" dirty="0"/>
           </a:p>
@@ -1432,7 +1432,7 @@
             <a:fld id="{F3131F9E-604E-4343-9F29-EF72E8231CAD}" type="datetime4">
               <a:rPr lang="en-US" smtClean="0"/>
               <a:pPr/>
-              <a:t>March 3, 2014</a:t>
+              <a:t>March 4, 2014</a:t>
             </a:fld>
             <a:endParaRPr lang="en-US"/>
           </a:p>
@@ -1967,7 +1967,7 @@
             <a:fld id="{34A8E1CE-37F8-4102-8DF9-852A0A51F293}" type="datetime4">
               <a:rPr lang="en-US" smtClean="0"/>
               <a:pPr/>
-              <a:t>March 3, 2014</a:t>
+              <a:t>March 4, 2014</a:t>
             </a:fld>
             <a:endParaRPr lang="en-US"/>
           </a:p>
@@ -2101,7 +2101,7 @@
             <a:fld id="{93333F43-3E86-47E4-BFBB-2476D384E1C6}" type="datetime4">
               <a:rPr lang="en-US" smtClean="0"/>
               <a:pPr/>
-              <a:t>March 3, 2014</a:t>
+              <a:t>March 4, 2014</a:t>
             </a:fld>
             <a:endParaRPr lang="en-US"/>
           </a:p>
@@ -2646,7 +2646,7 @@
             <a:fld id="{751663BA-01FC-4367-B6F3-ABB2645D55F1}" type="datetime4">
               <a:rPr lang="en-US" smtClean="0"/>
               <a:pPr/>
-              <a:t>March 3, 2014</a:t>
+              <a:t>March 4, 2014</a:t>
             </a:fld>
             <a:endParaRPr lang="en-US" dirty="0"/>
           </a:p>
@@ -2943,7 +2943,7 @@
             <a:fld id="{79B19C71-EC74-44AF-B27E-FC7DC3C3A61D}" type="datetime4">
               <a:rPr lang="en-US" smtClean="0"/>
               <a:pPr/>
-              <a:t>March 3, 2014</a:t>
+              <a:t>March 4, 2014</a:t>
             </a:fld>
             <a:endParaRPr lang="en-US"/>
           </a:p>
@@ -3604,7 +3604,7 @@
             <a:fld id="{6A5CDA29-3CBE-48EA-92AE-A996835462BA}" type="datetime4">
               <a:rPr lang="en-US" smtClean="0"/>
               <a:pPr/>
-              <a:t>March 3, 2014</a:t>
+              <a:t>March 4, 2014</a:t>
             </a:fld>
             <a:endParaRPr lang="en-US"/>
           </a:p>
@@ -4042,7 +4042,7 @@
             <a:fld id="{E29EC054-3869-4501-B163-1BBFDE8DCE04}" type="datetime4">
               <a:rPr lang="en-US" smtClean="0"/>
               <a:pPr/>
-              <a:t>March 3, 2014</a:t>
+              <a:t>March 4, 2014</a:t>
             </a:fld>
             <a:endParaRPr lang="en-US"/>
           </a:p>
@@ -4357,7 +4357,7 @@
             <a:fld id="{0A63D831-56C1-49CF-8EF7-8B9A98402BCD}" type="datetime4">
               <a:rPr lang="en-US" smtClean="0"/>
               <a:pPr/>
-              <a:t>March 3, 2014</a:t>
+              <a:t>March 4, 2014</a:t>
             </a:fld>
             <a:endParaRPr lang="en-US"/>
           </a:p>
@@ -5092,7 +5092,7 @@
             <a:fld id="{6EAD5615-7F4F-4584-84D5-CC95918C321F}" type="datetime4">
               <a:rPr lang="en-US" smtClean="0"/>
               <a:pPr/>
-              <a:t>March 3, 2014</a:t>
+              <a:t>March 4, 2014</a:t>
             </a:fld>
             <a:endParaRPr lang="en-US"/>
           </a:p>
@@ -5758,7 +5758,7 @@
             <a:fld id="{76EEA923-9BEE-48CE-9F28-5B525F399BAD}" type="datetime4">
               <a:rPr lang="en-US" smtClean="0"/>
               <a:pPr/>
-              <a:t>March 3, 2014</a:t>
+              <a:t>March 4, 2014</a:t>
             </a:fld>
             <a:endParaRPr lang="en-US"/>
           </a:p>
@@ -6032,7 +6032,7 @@
             <a:fld id="{17D0EFEE-2756-4A20-BF2A-63F0A94F99AC}" type="datetime4">
               <a:rPr lang="en-US" smtClean="0"/>
               <a:pPr/>
-              <a:t>March 3, 2014</a:t>
+              <a:t>March 4, 2014</a:t>
             </a:fld>
             <a:endParaRPr lang="en-US" dirty="0"/>
           </a:p>
@@ -6724,38 +6724,30 @@
           <a:p>
             <a:r>
               <a:rPr lang="en-US" dirty="0" smtClean="0"/>
-              <a:t>Or: the art of </a:t>
-            </a:r>
+              <a:t>Or: the art of sounding reasonable</a:t>
+            </a:r>
+            <a:endParaRPr lang="en-US" dirty="0"/>
+          </a:p>
+        </p:txBody>
+      </p:sp>
+      <p:sp>
+        <p:nvSpPr>
+          <p:cNvPr id="2" name="Title 1"/>
+          <p:cNvSpPr>
+            <a:spLocks noGrp="1"/>
+          </p:cNvSpPr>
+          <p:nvPr>
+            <p:ph type="ctrTitle"/>
+          </p:nvPr>
+        </p:nvSpPr>
+        <p:spPr/>
+        <p:txBody>
+          <a:bodyPr/>
+          <a:lstStyle/>
+          <a:p>
             <a:r>
               <a:rPr lang="en-US" dirty="0" smtClean="0"/>
-              <a:t>sounding reasonable</a:t>
-            </a:r>
-            <a:endParaRPr lang="en-US" dirty="0"/>
-          </a:p>
-        </p:txBody>
-      </p:sp>
-      <p:sp>
-        <p:nvSpPr>
-          <p:cNvPr id="2" name="Title 1"/>
-          <p:cNvSpPr>
-            <a:spLocks noGrp="1"/>
-          </p:cNvSpPr>
-          <p:nvPr>
-            <p:ph type="ctrTitle"/>
-          </p:nvPr>
-        </p:nvSpPr>
-        <p:spPr/>
-        <p:txBody>
-          <a:bodyPr/>
-          <a:lstStyle/>
-          <a:p>
-            <a:r>
-              <a:rPr lang="en-US" dirty="0" smtClean="0"/>
-              <a:t>A matter of </a:t>
-            </a:r>
-            <a:r>
-              <a:rPr lang="en-US" dirty="0" smtClean="0"/>
-              <a:t>truth</a:t>
+              <a:t>A matter of truth</a:t>
             </a:r>
             <a:endParaRPr lang="en-US" dirty="0"/>
           </a:p>
@@ -7126,28 +7118,19 @@
           <a:p>
             <a:r>
               <a:rPr lang="en-US" dirty="0" smtClean="0"/>
-              <a:t>Texas Attorney General Terry Branch:</a:t>
-            </a:r>
-          </a:p>
-          <a:p>
-            <a:pPr lvl="1"/>
-            <a:r>
-              <a:rPr lang="en-US" dirty="0"/>
-              <a:t>http://</a:t>
-            </a:r>
-            <a:r>
-              <a:rPr lang="en-US" dirty="0" err="1"/>
-              <a:t>youtu.be</a:t>
-            </a:r>
-            <a:r>
-              <a:rPr lang="en-US"/>
-              <a:t>/hnmvnk2UXV0</a:t>
-            </a:r>
-          </a:p>
-          <a:p>
+              <a:t>Texas Attorney </a:t>
+            </a:r>
+            <a:r>
+              <a:rPr lang="en-US" smtClean="0"/>
+              <a:t>General </a:t>
+            </a:r>
+            <a:r>
+              <a:rPr lang="en-US" smtClean="0"/>
+              <a:t>Dan Branch</a:t>
+            </a:r>
             <a:r>
               <a:rPr lang="en-US" dirty="0" smtClean="0"/>
-              <a:t>Sandra Watts and the Texas Voter ID Laws Controversy</a:t>
+              <a:t>:</a:t>
             </a:r>
           </a:p>
           <a:p>
@@ -7162,14 +7145,14 @@
               <a:rPr lang="en-US" dirty="0" smtClean="0">
                 <a:hlinkClick r:id="rId3"/>
               </a:rPr>
-              <a:t>PPQsJKpZKCM</a:t>
-            </a:r>
-            <a:endParaRPr lang="en-US" dirty="0" smtClean="0"/>
+              <a:t>hnmvnk2UXV0</a:t>
+            </a:r>
+            <a:endParaRPr lang="en-US" dirty="0"/>
           </a:p>
           <a:p>
             <a:r>
               <a:rPr lang="en-US" dirty="0" smtClean="0"/>
-              <a:t>Rick Perry Rebuttal to the DOJ concerns</a:t>
+              <a:t>Sandra Watts and the Texas Voter ID Laws Controversy</a:t>
             </a:r>
           </a:p>
           <a:p>
@@ -7178,11 +7161,33 @@
               <a:rPr lang="en-US" dirty="0">
                 <a:hlinkClick r:id="rId4"/>
               </a:rPr>
-              <a:t>http://video.foxnews.com/v/2625289022001/gov-perry-on-doj-plan-to-sue-texas-over-voter-id-law</a:t>
+              <a:t>http://youtu.be/</a:t>
             </a:r>
             <a:r>
               <a:rPr lang="en-US" dirty="0" smtClean="0">
                 <a:hlinkClick r:id="rId4"/>
+              </a:rPr>
+              <a:t>PPQsJKpZKCM</a:t>
+            </a:r>
+            <a:endParaRPr lang="en-US" dirty="0" smtClean="0"/>
+          </a:p>
+          <a:p>
+            <a:r>
+              <a:rPr lang="en-US" dirty="0" smtClean="0"/>
+              <a:t>Rick Perry Rebuttal to the DOJ concerns</a:t>
+            </a:r>
+          </a:p>
+          <a:p>
+            <a:pPr lvl="1"/>
+            <a:r>
+              <a:rPr lang="en-US" dirty="0">
+                <a:hlinkClick r:id="rId5"/>
+              </a:rPr>
+              <a:t>http://video.foxnews.com/v/2625289022001/gov-perry-on-doj-plan-to-sue-texas-over-voter-id-law</a:t>
+            </a:r>
+            <a:r>
+              <a:rPr lang="en-US" dirty="0" smtClean="0">
+                <a:hlinkClick r:id="rId5"/>
               </a:rPr>
               <a:t>/</a:t>
             </a:r>
@@ -7372,22 +7377,12 @@
               </a:rPr>
               <a:t>Logical Appeals</a:t>
             </a:r>
-            <a:endParaRPr lang="en-US" i="1" dirty="0" smtClean="0">
-              <a:solidFill>
-                <a:srgbClr val="D16349"/>
-              </a:solidFill>
-            </a:endParaRPr>
           </a:p>
           <a:p>
             <a:r>
               <a:rPr lang="en-US" i="1" dirty="0" smtClean="0"/>
-              <a:t>The art of sounding </a:t>
-            </a:r>
-            <a:r>
-              <a:rPr lang="en-US" i="1" dirty="0" smtClean="0"/>
-              <a:t>reasonable</a:t>
-            </a:r>
-            <a:endParaRPr lang="en-US" i="1" dirty="0" smtClean="0"/>
+              <a:t>The art of sounding reasonable</a:t>
+            </a:r>
           </a:p>
           <a:p>
             <a:r>
@@ -7414,11 +7409,6 @@
               </a:rPr>
               <a:t>Writing about logic</a:t>
             </a:r>
-            <a:endParaRPr lang="en-US" dirty="0" smtClean="0">
-              <a:solidFill>
-                <a:srgbClr val="D16349"/>
-              </a:solidFill>
-            </a:endParaRPr>
           </a:p>
           <a:p>
             <a:r>
@@ -7908,11 +7898,7 @@
           <a:p>
             <a:r>
               <a:rPr lang="en-US" dirty="0" smtClean="0"/>
-              <a:t>Review: </a:t>
-            </a:r>
-            <a:r>
-              <a:rPr lang="en-US" dirty="0" smtClean="0"/>
-              <a:t>Ethos &amp; Pathos</a:t>
+              <a:t>Review: Ethos &amp; Pathos</a:t>
             </a:r>
             <a:endParaRPr lang="en-US" dirty="0"/>
           </a:p>
@@ -8288,11 +8274,7 @@
           <a:p>
             <a:r>
               <a:rPr lang="en-US" dirty="0" smtClean="0"/>
-              <a:t>Writing break</a:t>
-            </a:r>
-            <a:r>
-              <a:rPr lang="en-US" dirty="0" smtClean="0"/>
-              <a:t>: Making a Claim </a:t>
+              <a:t>Writing break: Making a Claim </a:t>
             </a:r>
             <a:endParaRPr lang="en-US" dirty="0"/>
           </a:p>
@@ -8369,13 +8351,8 @@
             </a:r>
             <a:r>
               <a:rPr lang="en-US" dirty="0" smtClean="0"/>
-              <a:t>,” calling them “politica</a:t>
-            </a:r>
-            <a:r>
-              <a:rPr lang="en-US" dirty="0" smtClean="0"/>
-              <a:t>l termites.”</a:t>
-            </a:r>
-            <a:endParaRPr lang="en-US" dirty="0" smtClean="0"/>
+              <a:t>,” calling them “political termites.”</a:t>
+            </a:r>
           </a:p>
           <a:p>
             <a:pPr lvl="1"/>
@@ -8388,11 +8365,7 @@
             <a:pPr lvl="2"/>
             <a:r>
               <a:rPr lang="en-US" dirty="0" smtClean="0"/>
-              <a:t>This metaphor suggests that democrats are an invasive species which will destroy governmental infrastructure, leading to collapse. </a:t>
-            </a:r>
-            <a:r>
-              <a:rPr lang="en-US" dirty="0" smtClean="0"/>
-              <a:t>It further suggests that the only solution is extermination – and that Joe </a:t>
+              <a:t>This metaphor suggests that democrats are an invasive species which will destroy governmental infrastructure, leading to collapse. It further suggests that the only solution is extermination – and that Joe </a:t>
             </a:r>
             <a:r>
               <a:rPr lang="en-US" dirty="0" err="1" smtClean="0"/>

</xml_diff>